<commit_message>
Final presentation used in conference
</commit_message>
<xml_diff>
--- a/Presentation/francesc_wilhelmi_PIMRC_presentation.pptx
+++ b/Presentation/francesc_wilhelmi_PIMRC_presentation.pptx
@@ -4853,6 +4853,32 @@
           </a:p>
         </p:txBody>
       </p:sp>
+      <p:sp>
+        <p:nvSpPr>
+          <p:cNvPr id="3" name="TextBox 2"/>
+          <p:cNvSpPr txBox="1"/>
+          <p:nvPr/>
+        </p:nvSpPr>
+        <p:spPr>
+          <a:xfrm>
+            <a:off x="9802368" y="3995928"/>
+            <a:ext cx="184731" cy="369332"/>
+          </a:xfrm>
+          <a:prstGeom prst="rect">
+            <a:avLst/>
+          </a:prstGeom>
+          <a:noFill/>
+        </p:spPr>
+        <p:txBody>
+          <a:bodyPr wrap="none" rtlCol="0">
+            <a:spAutoFit/>
+          </a:bodyPr>
+          <a:lstStyle/>
+          <a:p>
+            <a:endParaRPr lang="en-US"/>
+          </a:p>
+        </p:txBody>
+      </p:sp>
     </p:spTree>
     <p:extLst>
       <p:ext uri="{BB962C8B-B14F-4D97-AF65-F5344CB8AC3E}">
@@ -4961,6 +4987,36 @@
           <a:chExt cx="0" cy="0"/>
         </a:xfrm>
       </p:grpSpPr>
+      <p:pic>
+        <p:nvPicPr>
+          <p:cNvPr id="12" name="Picture 11"/>
+          <p:cNvPicPr>
+            <a:picLocks noChangeAspect="1"/>
+          </p:cNvPicPr>
+          <p:nvPr/>
+        </p:nvPicPr>
+        <p:blipFill>
+          <a:blip r:embed="rId3">
+            <a:extLst>
+              <a:ext uri="{28A0092B-C50C-407E-A947-70E740481C1C}">
+                <a14:useLocalDpi xmlns:a14="http://schemas.microsoft.com/office/drawing/2010/main" val="0"/>
+              </a:ext>
+            </a:extLst>
+          </a:blip>
+          <a:stretch>
+            <a:fillRect/>
+          </a:stretch>
+        </p:blipFill>
+        <p:spPr>
+          <a:xfrm>
+            <a:off x="126422" y="1394616"/>
+            <a:ext cx="4758826" cy="2676413"/>
+          </a:xfrm>
+          <a:prstGeom prst="rect">
+            <a:avLst/>
+          </a:prstGeom>
+        </p:spPr>
+      </p:pic>
       <p:sp>
         <p:nvSpPr>
           <p:cNvPr id="4" name="Title 3"/>
@@ -5204,7 +5260,7 @@
                 <a:ea typeface="Times New Roman" charset="0"/>
                 <a:cs typeface="Times New Roman" charset="0"/>
               </a:rPr>
-              <a:t>17</a:t>
+              <a:t>11</a:t>
             </a:r>
             <a:endParaRPr lang="nl-NL" sz="1100" dirty="0">
               <a:latin typeface="Times New Roman" charset="0"/>
@@ -5249,8 +5305,8 @@
         </p:nvSpPr>
         <p:spPr>
           <a:xfrm>
-            <a:off x="1399484" y="4850007"/>
-            <a:ext cx="6382007" cy="261610"/>
+            <a:off x="827585" y="4556992"/>
+            <a:ext cx="4320480" cy="523220"/>
           </a:xfrm>
           <a:prstGeom prst="rect">
             <a:avLst/>
@@ -5263,7 +5319,7 @@
           <a:lstStyle/>
           <a:p>
             <a:r>
-              <a:rPr lang="en-US" sz="1100">
+              <a:rPr lang="en-US" sz="1400">
                 <a:latin typeface="Times New Roman" charset="0"/>
                 <a:ea typeface="Times New Roman" charset="0"/>
                 <a:cs typeface="Times New Roman" charset="0"/>
@@ -5273,36 +5329,6 @@
           </a:p>
         </p:txBody>
       </p:sp>
-      <p:pic>
-        <p:nvPicPr>
-          <p:cNvPr id="12" name="Picture 11"/>
-          <p:cNvPicPr>
-            <a:picLocks noChangeAspect="1"/>
-          </p:cNvPicPr>
-          <p:nvPr/>
-        </p:nvPicPr>
-        <p:blipFill>
-          <a:blip r:embed="rId3">
-            <a:extLst>
-              <a:ext uri="{28A0092B-C50C-407E-A947-70E740481C1C}">
-                <a14:useLocalDpi xmlns:a14="http://schemas.microsoft.com/office/drawing/2010/main" val="0"/>
-              </a:ext>
-            </a:extLst>
-          </a:blip>
-          <a:stretch>
-            <a:fillRect/>
-          </a:stretch>
-        </p:blipFill>
-        <p:spPr>
-          <a:xfrm>
-            <a:off x="126422" y="1394616"/>
-            <a:ext cx="4758826" cy="2676413"/>
-          </a:xfrm>
-          <a:prstGeom prst="rect">
-            <a:avLst/>
-          </a:prstGeom>
-        </p:spPr>
-      </p:pic>
       <p:pic>
         <p:nvPicPr>
           <p:cNvPr id="13" name="Picture 12"/>
@@ -5559,9 +5585,6 @@
                     <p:cTn id="3" fill="hold">
                       <p:stCondLst>
                         <p:cond delay="indefinite"/>
-                        <p:cond evt="onBegin" delay="0">
-                          <p:tn val="2"/>
-                        </p:cond>
                       </p:stCondLst>
                       <p:childTnLst>
                         <p:par>
@@ -5571,7 +5594,7 @@
                             </p:stCondLst>
                             <p:childTnLst>
                               <p:par>
-                                <p:cTn id="5" presetID="1" presetClass="entr" presetSubtype="0" fill="hold" grpId="1" nodeType="withEffect">
+                                <p:cTn id="5" presetID="1" presetClass="entr" presetSubtype="0" fill="hold" nodeType="clickEffect">
                                   <p:stCondLst>
                                     <p:cond delay="0"/>
                                   </p:stCondLst>
@@ -5584,7 +5607,7 @@
                                           </p:stCondLst>
                                         </p:cTn>
                                         <p:tgtEl>
-                                          <p:spTgt spid="20"/>
+                                          <p:spTgt spid="12"/>
                                         </p:tgtEl>
                                         <p:attrNameLst>
                                           <p:attrName>style.visibility</p:attrName>
@@ -5597,26 +5620,39 @@
                                   </p:childTnLst>
                                 </p:cTn>
                               </p:par>
-                            </p:childTnLst>
-                          </p:cTn>
-                        </p:par>
-                      </p:childTnLst>
-                    </p:cTn>
-                  </p:par>
-                  <p:par>
-                    <p:cTn id="7" fill="hold">
-                      <p:stCondLst>
-                        <p:cond delay="indefinite"/>
-                      </p:stCondLst>
-                      <p:childTnLst>
-                        <p:par>
-                          <p:cTn id="8" fill="hold">
-                            <p:stCondLst>
-                              <p:cond delay="0"/>
-                            </p:stCondLst>
-                            <p:childTnLst>
                               <p:par>
-                                <p:cTn id="9" presetID="1" presetClass="entr" presetSubtype="0" fill="hold" grpId="0" nodeType="clickEffect">
+                                <p:cTn id="7" presetID="1" presetClass="entr" presetSubtype="0" fill="hold" grpId="0" nodeType="withEffect">
+                                  <p:stCondLst>
+                                    <p:cond delay="0"/>
+                                  </p:stCondLst>
+                                  <p:childTnLst>
+                                    <p:set>
+                                      <p:cBhvr>
+                                        <p:cTn id="8" dur="1" fill="hold">
+                                          <p:stCondLst>
+                                            <p:cond delay="0"/>
+                                          </p:stCondLst>
+                                        </p:cTn>
+                                        <p:tgtEl>
+                                          <p:spTgt spid="20">
+                                            <p:txEl>
+                                              <p:pRg st="0" end="0"/>
+                                            </p:txEl>
+                                          </p:spTgt>
+                                        </p:tgtEl>
+                                        <p:attrNameLst>
+                                          <p:attrName>style.visibility</p:attrName>
+                                        </p:attrNameLst>
+                                      </p:cBhvr>
+                                      <p:to>
+                                        <p:strVal val="visible"/>
+                                      </p:to>
+                                    </p:set>
+                                  </p:childTnLst>
+                                </p:cTn>
+                              </p:par>
+                              <p:par>
+                                <p:cTn id="9" presetID="1" presetClass="entr" presetSubtype="0" fill="hold" grpId="0" nodeType="withEffect">
                                   <p:stCondLst>
                                     <p:cond delay="0"/>
                                   </p:stCondLst>
@@ -5629,7 +5665,7 @@
                                           </p:stCondLst>
                                         </p:cTn>
                                         <p:tgtEl>
-                                          <p:spTgt spid="5"/>
+                                          <p:spTgt spid="3"/>
                                         </p:tgtEl>
                                         <p:attrNameLst>
                                           <p:attrName>style.visibility</p:attrName>
@@ -5674,7 +5710,7 @@
                                           </p:stCondLst>
                                         </p:cTn>
                                         <p:tgtEl>
-                                          <p:spTgt spid="12"/>
+                                          <p:spTgt spid="13"/>
                                         </p:tgtEl>
                                         <p:attrNameLst>
                                           <p:attrName>style.visibility</p:attrName>
@@ -5701,7 +5737,7 @@
                                           </p:stCondLst>
                                         </p:cTn>
                                         <p:tgtEl>
-                                          <p:spTgt spid="13"/>
+                                          <p:spTgt spid="15"/>
                                         </p:tgtEl>
                                         <p:attrNameLst>
                                           <p:attrName>style.visibility</p:attrName>
@@ -5715,7 +5751,7 @@
                                 </p:cTn>
                               </p:par>
                               <p:par>
-                                <p:cTn id="17" presetID="1" presetClass="entr" presetSubtype="0" fill="hold" nodeType="withEffect">
+                                <p:cTn id="17" presetID="1" presetClass="entr" presetSubtype="0" fill="hold" grpId="0" nodeType="withEffect">
                                   <p:stCondLst>
                                     <p:cond delay="0"/>
                                   </p:stCondLst>
@@ -5728,7 +5764,7 @@
                                           </p:stCondLst>
                                         </p:cTn>
                                         <p:tgtEl>
-                                          <p:spTgt spid="15"/>
+                                          <p:spTgt spid="5"/>
                                         </p:tgtEl>
                                         <p:attrNameLst>
                                           <p:attrName>style.visibility</p:attrName>
@@ -5769,7 +5805,8 @@
       </p:par>
     </p:tnLst>
     <p:bldLst>
-      <p:bldP spid="20" grpId="1"/>
+      <p:bldP spid="20" grpId="0" build="p"/>
+      <p:bldP spid="3" grpId="0"/>
       <p:bldP spid="5" grpId="0" animBg="1"/>
     </p:bldLst>
   </p:timing>
@@ -5841,7 +5878,7 @@
                 <a:ea typeface="Times New Roman" charset="0"/>
                 <a:cs typeface="Times New Roman" charset="0"/>
               </a:rPr>
-              <a:t>18</a:t>
+              <a:t>12</a:t>
             </a:r>
             <a:endParaRPr lang="nl-NL" sz="1100" dirty="0">
               <a:latin typeface="Times New Roman" charset="0"/>
@@ -6867,7 +6904,7 @@
                             </p:stCondLst>
                             <p:childTnLst>
                               <p:par>
-                                <p:cTn id="5" presetID="1" presetClass="entr" presetSubtype="0" fill="hold" grpId="0" nodeType="clickEffect">
+                                <p:cTn id="5" presetID="1" presetClass="entr" presetSubtype="0" fill="hold" grpId="1" nodeType="clickEffect">
                                   <p:stCondLst>
                                     <p:cond delay="0"/>
                                   </p:stCondLst>
@@ -6957,7 +6994,7 @@
                             </p:stCondLst>
                             <p:childTnLst>
                               <p:par>
-                                <p:cTn id="13" presetID="1" presetClass="entr" presetSubtype="0" fill="hold" grpId="0" nodeType="clickEffect">
+                                <p:cTn id="13" presetID="1" presetClass="entr" presetSubtype="0" fill="hold" nodeType="clickEffect">
                                   <p:stCondLst>
                                     <p:cond delay="0"/>
                                   </p:stCondLst>
@@ -6965,6 +7002,186 @@
                                     <p:set>
                                       <p:cBhvr>
                                         <p:cTn id="14" dur="1" fill="hold">
+                                          <p:stCondLst>
+                                            <p:cond delay="0"/>
+                                          </p:stCondLst>
+                                        </p:cTn>
+                                        <p:tgtEl>
+                                          <p:spTgt spid="14"/>
+                                        </p:tgtEl>
+                                        <p:attrNameLst>
+                                          <p:attrName>style.visibility</p:attrName>
+                                        </p:attrNameLst>
+                                      </p:cBhvr>
+                                      <p:to>
+                                        <p:strVal val="visible"/>
+                                      </p:to>
+                                    </p:set>
+                                  </p:childTnLst>
+                                </p:cTn>
+                              </p:par>
+                            </p:childTnLst>
+                          </p:cTn>
+                        </p:par>
+                      </p:childTnLst>
+                    </p:cTn>
+                  </p:par>
+                  <p:par>
+                    <p:cTn id="15" fill="hold">
+                      <p:stCondLst>
+                        <p:cond delay="indefinite"/>
+                      </p:stCondLst>
+                      <p:childTnLst>
+                        <p:par>
+                          <p:cTn id="16" fill="hold">
+                            <p:stCondLst>
+                              <p:cond delay="0"/>
+                            </p:stCondLst>
+                            <p:childTnLst>
+                              <p:par>
+                                <p:cTn id="17" presetID="1" presetClass="entr" presetSubtype="0" fill="hold" nodeType="clickEffect">
+                                  <p:stCondLst>
+                                    <p:cond delay="0"/>
+                                  </p:stCondLst>
+                                  <p:childTnLst>
+                                    <p:set>
+                                      <p:cBhvr>
+                                        <p:cTn id="18" dur="1" fill="hold">
+                                          <p:stCondLst>
+                                            <p:cond delay="0"/>
+                                          </p:stCondLst>
+                                        </p:cTn>
+                                        <p:tgtEl>
+                                          <p:spTgt spid="8"/>
+                                        </p:tgtEl>
+                                        <p:attrNameLst>
+                                          <p:attrName>style.visibility</p:attrName>
+                                        </p:attrNameLst>
+                                      </p:cBhvr>
+                                      <p:to>
+                                        <p:strVal val="visible"/>
+                                      </p:to>
+                                    </p:set>
+                                  </p:childTnLst>
+                                </p:cTn>
+                              </p:par>
+                            </p:childTnLst>
+                          </p:cTn>
+                        </p:par>
+                      </p:childTnLst>
+                    </p:cTn>
+                  </p:par>
+                  <p:par>
+                    <p:cTn id="19" fill="hold">
+                      <p:stCondLst>
+                        <p:cond delay="indefinite"/>
+                      </p:stCondLst>
+                      <p:childTnLst>
+                        <p:par>
+                          <p:cTn id="20" fill="hold">
+                            <p:stCondLst>
+                              <p:cond delay="0"/>
+                            </p:stCondLst>
+                            <p:childTnLst>
+                              <p:par>
+                                <p:cTn id="21" presetID="1" presetClass="entr" presetSubtype="0" fill="hold" nodeType="clickEffect">
+                                  <p:stCondLst>
+                                    <p:cond delay="0"/>
+                                  </p:stCondLst>
+                                  <p:childTnLst>
+                                    <p:set>
+                                      <p:cBhvr>
+                                        <p:cTn id="22" dur="1" fill="hold">
+                                          <p:stCondLst>
+                                            <p:cond delay="0"/>
+                                          </p:stCondLst>
+                                        </p:cTn>
+                                        <p:tgtEl>
+                                          <p:spTgt spid="18"/>
+                                        </p:tgtEl>
+                                        <p:attrNameLst>
+                                          <p:attrName>style.visibility</p:attrName>
+                                        </p:attrNameLst>
+                                      </p:cBhvr>
+                                      <p:to>
+                                        <p:strVal val="visible"/>
+                                      </p:to>
+                                    </p:set>
+                                  </p:childTnLst>
+                                </p:cTn>
+                              </p:par>
+                            </p:childTnLst>
+                          </p:cTn>
+                        </p:par>
+                      </p:childTnLst>
+                    </p:cTn>
+                  </p:par>
+                  <p:par>
+                    <p:cTn id="23" fill="hold">
+                      <p:stCondLst>
+                        <p:cond delay="indefinite"/>
+                      </p:stCondLst>
+                      <p:childTnLst>
+                        <p:par>
+                          <p:cTn id="24" fill="hold">
+                            <p:stCondLst>
+                              <p:cond delay="0"/>
+                            </p:stCondLst>
+                            <p:childTnLst>
+                              <p:par>
+                                <p:cTn id="25" presetID="1" presetClass="entr" presetSubtype="0" fill="hold" nodeType="clickEffect">
+                                  <p:stCondLst>
+                                    <p:cond delay="0"/>
+                                  </p:stCondLst>
+                                  <p:childTnLst>
+                                    <p:set>
+                                      <p:cBhvr>
+                                        <p:cTn id="26" dur="1" fill="hold">
+                                          <p:stCondLst>
+                                            <p:cond delay="0"/>
+                                          </p:stCondLst>
+                                        </p:cTn>
+                                        <p:tgtEl>
+                                          <p:spTgt spid="7"/>
+                                        </p:tgtEl>
+                                        <p:attrNameLst>
+                                          <p:attrName>style.visibility</p:attrName>
+                                        </p:attrNameLst>
+                                      </p:cBhvr>
+                                      <p:to>
+                                        <p:strVal val="visible"/>
+                                      </p:to>
+                                    </p:set>
+                                  </p:childTnLst>
+                                </p:cTn>
+                              </p:par>
+                            </p:childTnLst>
+                          </p:cTn>
+                        </p:par>
+                      </p:childTnLst>
+                    </p:cTn>
+                  </p:par>
+                  <p:par>
+                    <p:cTn id="27" fill="hold">
+                      <p:stCondLst>
+                        <p:cond delay="indefinite"/>
+                      </p:stCondLst>
+                      <p:childTnLst>
+                        <p:par>
+                          <p:cTn id="28" fill="hold">
+                            <p:stCondLst>
+                              <p:cond delay="0"/>
+                            </p:stCondLst>
+                            <p:childTnLst>
+                              <p:par>
+                                <p:cTn id="29" presetID="1" presetClass="entr" presetSubtype="0" fill="hold" grpId="0" nodeType="clickEffect">
+                                  <p:stCondLst>
+                                    <p:cond delay="0"/>
+                                  </p:stCondLst>
+                                  <p:childTnLst>
+                                    <p:set>
+                                      <p:cBhvr>
+                                        <p:cTn id="30" dur="1" fill="hold">
                                           <p:stCondLst>
                                             <p:cond delay="0"/>
                                           </p:stCondLst>
@@ -7012,7 +7229,7 @@
     </p:tnLst>
     <p:bldLst>
       <p:bldP spid="22" grpId="0"/>
-      <p:bldP spid="25" grpId="0"/>
+      <p:bldP spid="25" grpId="1"/>
     </p:bldLst>
   </p:timing>
 </p:sld>
@@ -7083,7 +7300,7 @@
                 <a:ea typeface="Times New Roman" charset="0"/>
                 <a:cs typeface="Times New Roman" charset="0"/>
               </a:rPr>
-              <a:t>20</a:t>
+              <a:t>13</a:t>
             </a:r>
             <a:endParaRPr lang="nl-NL" sz="1100" dirty="0">
               <a:latin typeface="Times New Roman" charset="0"/>
@@ -7105,7 +7322,7 @@
         </p:nvSpPr>
         <p:spPr>
           <a:xfrm>
-            <a:off x="210725" y="2427534"/>
+            <a:off x="210725" y="2355526"/>
             <a:ext cx="3204315" cy="1499582"/>
           </a:xfrm>
         </p:spPr>
@@ -7114,26 +7331,26 @@
           <a:lstStyle/>
           <a:p>
             <a:r>
-              <a:rPr lang="en-US" sz="1800"/>
+              <a:rPr lang="en-US"/>
               <a:t>A higher fairness is noticed as 𝜀</a:t>
             </a:r>
             <a:r>
-              <a:rPr lang="en-US" sz="1800" baseline="-25000"/>
+              <a:rPr lang="en-US" baseline="-25000"/>
               <a:t>0</a:t>
             </a:r>
             <a:r>
-              <a:rPr lang="en-US" sz="1800"/>
+              <a:rPr lang="en-US"/>
               <a:t> </a:t>
             </a:r>
             <a:r>
-              <a:rPr lang="en-US" sz="1800" dirty="0"/>
+              <a:rPr lang="en-US" dirty="0"/>
               <a:t>increases</a:t>
             </a:r>
-            <a:endParaRPr lang="en-US" sz="1800"/>
-          </a:p>
-          <a:p>
-            <a:r>
-              <a:rPr lang="en-US" sz="1800"/>
+            <a:endParaRPr lang="en-US"/>
+          </a:p>
+          <a:p>
+            <a:r>
+              <a:rPr lang="en-US"/>
               <a:t>A high {𝛼, 𝛾} pair entails a higher aggregate throughput</a:t>
             </a:r>
           </a:p>
@@ -7149,7 +7366,7 @@
         </p:nvSpPr>
         <p:spPr>
           <a:xfrm>
-            <a:off x="216488" y="1851670"/>
+            <a:off x="216488" y="1707654"/>
             <a:ext cx="3137042" cy="672185"/>
           </a:xfrm>
           <a:prstGeom prst="rect">
@@ -7314,7 +7531,7 @@
           </a:lstStyle>
           <a:p>
             <a:r>
-              <a:rPr lang="en-US" sz="1800"/>
+              <a:rPr lang="en-US"/>
               <a:t>Single simulation of 10,000 iterations</a:t>
             </a:r>
           </a:p>
@@ -8085,7 +8302,7 @@
                             </p:stCondLst>
                             <p:childTnLst>
                               <p:par>
-                                <p:cTn id="5" presetID="1" presetClass="entr" presetSubtype="0" fill="hold" grpId="0" nodeType="clickEffect">
+                                <p:cTn id="5" presetID="1" presetClass="entr" presetSubtype="0" fill="hold" grpId="1" nodeType="clickEffect">
                                   <p:stCondLst>
                                     <p:cond delay="0"/>
                                   </p:stCondLst>
@@ -8130,7 +8347,7 @@
                             </p:stCondLst>
                             <p:childTnLst>
                               <p:par>
-                                <p:cTn id="9" presetID="1" presetClass="entr" presetSubtype="0" fill="hold" grpId="0" nodeType="clickEffect">
+                                <p:cTn id="9" presetID="1" presetClass="entr" presetSubtype="0" fill="hold" nodeType="clickEffect">
                                   <p:stCondLst>
                                     <p:cond delay="0"/>
                                   </p:stCondLst>
@@ -8138,6 +8355,186 @@
                                     <p:set>
                                       <p:cBhvr>
                                         <p:cTn id="10" dur="1" fill="hold">
+                                          <p:stCondLst>
+                                            <p:cond delay="0"/>
+                                          </p:stCondLst>
+                                        </p:cTn>
+                                        <p:tgtEl>
+                                          <p:spTgt spid="5"/>
+                                        </p:tgtEl>
+                                        <p:attrNameLst>
+                                          <p:attrName>style.visibility</p:attrName>
+                                        </p:attrNameLst>
+                                      </p:cBhvr>
+                                      <p:to>
+                                        <p:strVal val="visible"/>
+                                      </p:to>
+                                    </p:set>
+                                  </p:childTnLst>
+                                </p:cTn>
+                              </p:par>
+                            </p:childTnLst>
+                          </p:cTn>
+                        </p:par>
+                      </p:childTnLst>
+                    </p:cTn>
+                  </p:par>
+                  <p:par>
+                    <p:cTn id="11" fill="hold">
+                      <p:stCondLst>
+                        <p:cond delay="indefinite"/>
+                      </p:stCondLst>
+                      <p:childTnLst>
+                        <p:par>
+                          <p:cTn id="12" fill="hold">
+                            <p:stCondLst>
+                              <p:cond delay="0"/>
+                            </p:stCondLst>
+                            <p:childTnLst>
+                              <p:par>
+                                <p:cTn id="13" presetID="1" presetClass="entr" presetSubtype="0" fill="hold" nodeType="clickEffect">
+                                  <p:stCondLst>
+                                    <p:cond delay="0"/>
+                                  </p:stCondLst>
+                                  <p:childTnLst>
+                                    <p:set>
+                                      <p:cBhvr>
+                                        <p:cTn id="14" dur="1" fill="hold">
+                                          <p:stCondLst>
+                                            <p:cond delay="0"/>
+                                          </p:stCondLst>
+                                        </p:cTn>
+                                        <p:tgtEl>
+                                          <p:spTgt spid="24"/>
+                                        </p:tgtEl>
+                                        <p:attrNameLst>
+                                          <p:attrName>style.visibility</p:attrName>
+                                        </p:attrNameLst>
+                                      </p:cBhvr>
+                                      <p:to>
+                                        <p:strVal val="visible"/>
+                                      </p:to>
+                                    </p:set>
+                                  </p:childTnLst>
+                                </p:cTn>
+                              </p:par>
+                            </p:childTnLst>
+                          </p:cTn>
+                        </p:par>
+                      </p:childTnLst>
+                    </p:cTn>
+                  </p:par>
+                  <p:par>
+                    <p:cTn id="15" fill="hold">
+                      <p:stCondLst>
+                        <p:cond delay="indefinite"/>
+                      </p:stCondLst>
+                      <p:childTnLst>
+                        <p:par>
+                          <p:cTn id="16" fill="hold">
+                            <p:stCondLst>
+                              <p:cond delay="0"/>
+                            </p:stCondLst>
+                            <p:childTnLst>
+                              <p:par>
+                                <p:cTn id="17" presetID="1" presetClass="entr" presetSubtype="0" fill="hold" nodeType="clickEffect">
+                                  <p:stCondLst>
+                                    <p:cond delay="0"/>
+                                  </p:stCondLst>
+                                  <p:childTnLst>
+                                    <p:set>
+                                      <p:cBhvr>
+                                        <p:cTn id="18" dur="1" fill="hold">
+                                          <p:stCondLst>
+                                            <p:cond delay="0"/>
+                                          </p:stCondLst>
+                                        </p:cTn>
+                                        <p:tgtEl>
+                                          <p:spTgt spid="25"/>
+                                        </p:tgtEl>
+                                        <p:attrNameLst>
+                                          <p:attrName>style.visibility</p:attrName>
+                                        </p:attrNameLst>
+                                      </p:cBhvr>
+                                      <p:to>
+                                        <p:strVal val="visible"/>
+                                      </p:to>
+                                    </p:set>
+                                  </p:childTnLst>
+                                </p:cTn>
+                              </p:par>
+                            </p:childTnLst>
+                          </p:cTn>
+                        </p:par>
+                      </p:childTnLst>
+                    </p:cTn>
+                  </p:par>
+                  <p:par>
+                    <p:cTn id="19" fill="hold">
+                      <p:stCondLst>
+                        <p:cond delay="indefinite"/>
+                      </p:stCondLst>
+                      <p:childTnLst>
+                        <p:par>
+                          <p:cTn id="20" fill="hold">
+                            <p:stCondLst>
+                              <p:cond delay="0"/>
+                            </p:stCondLst>
+                            <p:childTnLst>
+                              <p:par>
+                                <p:cTn id="21" presetID="1" presetClass="entr" presetSubtype="0" fill="hold" nodeType="clickEffect">
+                                  <p:stCondLst>
+                                    <p:cond delay="0"/>
+                                  </p:stCondLst>
+                                  <p:childTnLst>
+                                    <p:set>
+                                      <p:cBhvr>
+                                        <p:cTn id="22" dur="1" fill="hold">
+                                          <p:stCondLst>
+                                            <p:cond delay="0"/>
+                                          </p:stCondLst>
+                                        </p:cTn>
+                                        <p:tgtEl>
+                                          <p:spTgt spid="14"/>
+                                        </p:tgtEl>
+                                        <p:attrNameLst>
+                                          <p:attrName>style.visibility</p:attrName>
+                                        </p:attrNameLst>
+                                      </p:cBhvr>
+                                      <p:to>
+                                        <p:strVal val="visible"/>
+                                      </p:to>
+                                    </p:set>
+                                  </p:childTnLst>
+                                </p:cTn>
+                              </p:par>
+                            </p:childTnLst>
+                          </p:cTn>
+                        </p:par>
+                      </p:childTnLst>
+                    </p:cTn>
+                  </p:par>
+                  <p:par>
+                    <p:cTn id="23" fill="hold">
+                      <p:stCondLst>
+                        <p:cond delay="indefinite"/>
+                      </p:stCondLst>
+                      <p:childTnLst>
+                        <p:par>
+                          <p:cTn id="24" fill="hold">
+                            <p:stCondLst>
+                              <p:cond delay="0"/>
+                            </p:stCondLst>
+                            <p:childTnLst>
+                              <p:par>
+                                <p:cTn id="25" presetID="1" presetClass="entr" presetSubtype="0" fill="hold" grpId="1" nodeType="clickEffect">
+                                  <p:stCondLst>
+                                    <p:cond delay="0"/>
+                                  </p:stCondLst>
+                                  <p:childTnLst>
+                                    <p:set>
+                                      <p:cBhvr>
+                                        <p:cTn id="26" dur="1" fill="hold">
                                           <p:stCondLst>
                                             <p:cond delay="0"/>
                                           </p:stCondLst>
@@ -8184,8 +8581,8 @@
       </p:par>
     </p:tnLst>
     <p:bldLst>
-      <p:bldP spid="20" grpId="0"/>
-      <p:bldP spid="18" grpId="0"/>
+      <p:bldP spid="20" grpId="1"/>
+      <p:bldP spid="18" grpId="1"/>
     </p:bldLst>
   </p:timing>
 </p:sld>
@@ -8256,7 +8653,7 @@
                 <a:ea typeface="Times New Roman" charset="0"/>
                 <a:cs typeface="Times New Roman" charset="0"/>
               </a:rPr>
-              <a:t>19</a:t>
+              <a:t>14</a:t>
             </a:r>
             <a:endParaRPr lang="nl-NL" sz="1100" dirty="0">
               <a:latin typeface="Times New Roman" charset="0"/>
@@ -8287,26 +8684,26 @@
           <a:lstStyle/>
           <a:p>
             <a:r>
-              <a:rPr lang="en-US" sz="1800"/>
+              <a:rPr lang="en-US"/>
               <a:t>A higher variability is noticed as 𝜀</a:t>
             </a:r>
             <a:r>
-              <a:rPr lang="en-US" sz="1800" baseline="-25000"/>
+              <a:rPr lang="en-US" baseline="-25000"/>
               <a:t>0</a:t>
             </a:r>
             <a:r>
-              <a:rPr lang="en-US" sz="1800"/>
+              <a:rPr lang="en-US"/>
               <a:t> </a:t>
             </a:r>
             <a:r>
-              <a:rPr lang="en-US" sz="1800" dirty="0"/>
+              <a:rPr lang="en-US" dirty="0"/>
               <a:t>increases</a:t>
             </a:r>
-            <a:endParaRPr lang="en-US" sz="1800"/>
-          </a:p>
-          <a:p>
-            <a:r>
-              <a:rPr lang="en-US" sz="1800"/>
+            <a:endParaRPr lang="en-US"/>
+          </a:p>
+          <a:p>
+            <a:r>
+              <a:rPr lang="en-US"/>
               <a:t>A high {𝛼, 𝛾} pair entails more variability</a:t>
             </a:r>
           </a:p>
@@ -8322,7 +8719,7 @@
         </p:nvSpPr>
         <p:spPr>
           <a:xfrm>
-            <a:off x="216488" y="1851670"/>
+            <a:off x="216488" y="1779662"/>
             <a:ext cx="3137042" cy="672185"/>
           </a:xfrm>
           <a:prstGeom prst="rect">
@@ -8487,7 +8884,7 @@
           </a:lstStyle>
           <a:p>
             <a:r>
-              <a:rPr lang="en-US" sz="1800"/>
+              <a:rPr lang="en-US"/>
               <a:t>Single simulation of 10,000 iterations</a:t>
             </a:r>
           </a:p>
@@ -9303,7 +9700,7 @@
                             </p:stCondLst>
                             <p:childTnLst>
                               <p:par>
-                                <p:cTn id="9" presetID="1" presetClass="entr" presetSubtype="0" fill="hold" grpId="0" nodeType="clickEffect">
+                                <p:cTn id="9" presetID="1" presetClass="entr" presetSubtype="0" fill="hold" nodeType="clickEffect">
                                   <p:stCondLst>
                                     <p:cond delay="0"/>
                                   </p:stCondLst>
@@ -9316,7 +9713,240 @@
                                           </p:stCondLst>
                                         </p:cTn>
                                         <p:tgtEl>
-                                          <p:spTgt spid="19"/>
+                                          <p:spTgt spid="15"/>
+                                        </p:tgtEl>
+                                        <p:attrNameLst>
+                                          <p:attrName>style.visibility</p:attrName>
+                                        </p:attrNameLst>
+                                      </p:cBhvr>
+                                      <p:to>
+                                        <p:strVal val="visible"/>
+                                      </p:to>
+                                    </p:set>
+                                  </p:childTnLst>
+                                </p:cTn>
+                              </p:par>
+                            </p:childTnLst>
+                          </p:cTn>
+                        </p:par>
+                      </p:childTnLst>
+                    </p:cTn>
+                  </p:par>
+                  <p:par>
+                    <p:cTn id="11" fill="hold">
+                      <p:stCondLst>
+                        <p:cond delay="indefinite"/>
+                      </p:stCondLst>
+                      <p:childTnLst>
+                        <p:par>
+                          <p:cTn id="12" fill="hold">
+                            <p:stCondLst>
+                              <p:cond delay="0"/>
+                            </p:stCondLst>
+                            <p:childTnLst>
+                              <p:par>
+                                <p:cTn id="13" presetID="1" presetClass="entr" presetSubtype="0" fill="hold" nodeType="clickEffect">
+                                  <p:stCondLst>
+                                    <p:cond delay="0"/>
+                                  </p:stCondLst>
+                                  <p:childTnLst>
+                                    <p:set>
+                                      <p:cBhvr>
+                                        <p:cTn id="14" dur="1" fill="hold">
+                                          <p:stCondLst>
+                                            <p:cond delay="0"/>
+                                          </p:stCondLst>
+                                        </p:cTn>
+                                        <p:tgtEl>
+                                          <p:spTgt spid="23"/>
+                                        </p:tgtEl>
+                                        <p:attrNameLst>
+                                          <p:attrName>style.visibility</p:attrName>
+                                        </p:attrNameLst>
+                                      </p:cBhvr>
+                                      <p:to>
+                                        <p:strVal val="visible"/>
+                                      </p:to>
+                                    </p:set>
+                                  </p:childTnLst>
+                                </p:cTn>
+                              </p:par>
+                            </p:childTnLst>
+                          </p:cTn>
+                        </p:par>
+                      </p:childTnLst>
+                    </p:cTn>
+                  </p:par>
+                  <p:par>
+                    <p:cTn id="15" fill="hold">
+                      <p:stCondLst>
+                        <p:cond delay="indefinite"/>
+                      </p:stCondLst>
+                      <p:childTnLst>
+                        <p:par>
+                          <p:cTn id="16" fill="hold">
+                            <p:stCondLst>
+                              <p:cond delay="0"/>
+                            </p:stCondLst>
+                            <p:childTnLst>
+                              <p:par>
+                                <p:cTn id="17" presetID="1" presetClass="entr" presetSubtype="0" fill="hold" nodeType="clickEffect">
+                                  <p:stCondLst>
+                                    <p:cond delay="0"/>
+                                  </p:stCondLst>
+                                  <p:childTnLst>
+                                    <p:set>
+                                      <p:cBhvr>
+                                        <p:cTn id="18" dur="1" fill="hold">
+                                          <p:stCondLst>
+                                            <p:cond delay="0"/>
+                                          </p:stCondLst>
+                                        </p:cTn>
+                                        <p:tgtEl>
+                                          <p:spTgt spid="17"/>
+                                        </p:tgtEl>
+                                        <p:attrNameLst>
+                                          <p:attrName>style.visibility</p:attrName>
+                                        </p:attrNameLst>
+                                      </p:cBhvr>
+                                      <p:to>
+                                        <p:strVal val="visible"/>
+                                      </p:to>
+                                    </p:set>
+                                  </p:childTnLst>
+                                </p:cTn>
+                              </p:par>
+                            </p:childTnLst>
+                          </p:cTn>
+                        </p:par>
+                      </p:childTnLst>
+                    </p:cTn>
+                  </p:par>
+                  <p:par>
+                    <p:cTn id="19" fill="hold">
+                      <p:stCondLst>
+                        <p:cond delay="indefinite"/>
+                      </p:stCondLst>
+                      <p:childTnLst>
+                        <p:par>
+                          <p:cTn id="20" fill="hold">
+                            <p:stCondLst>
+                              <p:cond delay="0"/>
+                            </p:stCondLst>
+                            <p:childTnLst>
+                              <p:par>
+                                <p:cTn id="21" presetID="1" presetClass="entr" presetSubtype="0" fill="hold" nodeType="clickEffect">
+                                  <p:stCondLst>
+                                    <p:cond delay="0"/>
+                                  </p:stCondLst>
+                                  <p:childTnLst>
+                                    <p:set>
+                                      <p:cBhvr>
+                                        <p:cTn id="22" dur="1" fill="hold">
+                                          <p:stCondLst>
+                                            <p:cond delay="0"/>
+                                          </p:stCondLst>
+                                        </p:cTn>
+                                        <p:tgtEl>
+                                          <p:spTgt spid="25"/>
+                                        </p:tgtEl>
+                                        <p:attrNameLst>
+                                          <p:attrName>style.visibility</p:attrName>
+                                        </p:attrNameLst>
+                                      </p:cBhvr>
+                                      <p:to>
+                                        <p:strVal val="visible"/>
+                                      </p:to>
+                                    </p:set>
+                                  </p:childTnLst>
+                                </p:cTn>
+                              </p:par>
+                            </p:childTnLst>
+                          </p:cTn>
+                        </p:par>
+                      </p:childTnLst>
+                    </p:cTn>
+                  </p:par>
+                  <p:par>
+                    <p:cTn id="23" fill="hold">
+                      <p:stCondLst>
+                        <p:cond delay="indefinite"/>
+                      </p:stCondLst>
+                      <p:childTnLst>
+                        <p:par>
+                          <p:cTn id="24" fill="hold">
+                            <p:stCondLst>
+                              <p:cond delay="0"/>
+                            </p:stCondLst>
+                            <p:childTnLst>
+                              <p:par>
+                                <p:cTn id="25" presetID="1" presetClass="entr" presetSubtype="0" fill="hold" grpId="0" nodeType="clickEffect">
+                                  <p:stCondLst>
+                                    <p:cond delay="0"/>
+                                  </p:stCondLst>
+                                  <p:childTnLst>
+                                    <p:set>
+                                      <p:cBhvr>
+                                        <p:cTn id="26" dur="1" fill="hold">
+                                          <p:stCondLst>
+                                            <p:cond delay="0"/>
+                                          </p:stCondLst>
+                                        </p:cTn>
+                                        <p:tgtEl>
+                                          <p:spTgt spid="19">
+                                            <p:txEl>
+                                              <p:pRg st="0" end="0"/>
+                                            </p:txEl>
+                                          </p:spTgt>
+                                        </p:tgtEl>
+                                        <p:attrNameLst>
+                                          <p:attrName>style.visibility</p:attrName>
+                                        </p:attrNameLst>
+                                      </p:cBhvr>
+                                      <p:to>
+                                        <p:strVal val="visible"/>
+                                      </p:to>
+                                    </p:set>
+                                  </p:childTnLst>
+                                </p:cTn>
+                              </p:par>
+                            </p:childTnLst>
+                          </p:cTn>
+                        </p:par>
+                      </p:childTnLst>
+                    </p:cTn>
+                  </p:par>
+                  <p:par>
+                    <p:cTn id="27" fill="hold">
+                      <p:stCondLst>
+                        <p:cond delay="indefinite"/>
+                      </p:stCondLst>
+                      <p:childTnLst>
+                        <p:par>
+                          <p:cTn id="28" fill="hold">
+                            <p:stCondLst>
+                              <p:cond delay="0"/>
+                            </p:stCondLst>
+                            <p:childTnLst>
+                              <p:par>
+                                <p:cTn id="29" presetID="1" presetClass="entr" presetSubtype="0" fill="hold" grpId="0" nodeType="clickEffect">
+                                  <p:stCondLst>
+                                    <p:cond delay="0"/>
+                                  </p:stCondLst>
+                                  <p:childTnLst>
+                                    <p:set>
+                                      <p:cBhvr>
+                                        <p:cTn id="30" dur="1" fill="hold">
+                                          <p:stCondLst>
+                                            <p:cond delay="0"/>
+                                          </p:stCondLst>
+                                        </p:cTn>
+                                        <p:tgtEl>
+                                          <p:spTgt spid="19">
+                                            <p:txEl>
+                                              <p:pRg st="1" end="1"/>
+                                            </p:txEl>
+                                          </p:spTgt>
                                         </p:tgtEl>
                                         <p:attrNameLst>
                                           <p:attrName>style.visibility</p:attrName>
@@ -9357,7 +9987,7 @@
       </p:par>
     </p:tnLst>
     <p:bldLst>
-      <p:bldP spid="19" grpId="0"/>
+      <p:bldP spid="19" grpId="0" build="p"/>
       <p:bldP spid="14" grpId="0"/>
     </p:bldLst>
   </p:timing>
@@ -9514,12 +10144,12 @@
           <a:lstStyle/>
           <a:p>
             <a:r>
-              <a:rPr lang="nl-NL" sz="2000" smtClean="0">
+              <a:rPr lang="nl-NL" sz="2000">
                 <a:latin typeface="Times New Roman" charset="0"/>
                 <a:ea typeface="Times New Roman" charset="0"/>
                 <a:cs typeface="Times New Roman" charset="0"/>
               </a:rPr>
-              <a:t>22</a:t>
+              <a:t>16</a:t>
             </a:r>
             <a:endParaRPr lang="nl-NL" sz="1100" dirty="0">
               <a:latin typeface="Times New Roman" charset="0"/>
@@ -12045,7 +12675,7 @@
                 <a:ea typeface="Times New Roman" charset="0"/>
                 <a:cs typeface="Times New Roman" charset="0"/>
               </a:rPr>
-              <a:t>7</a:t>
+              <a:t>18</a:t>
             </a:r>
             <a:endParaRPr lang="nl-NL" sz="1100" dirty="0">
               <a:latin typeface="Times New Roman" charset="0"/>
@@ -13705,7 +14335,7 @@
                 <a:ea typeface="Times New Roman" charset="0"/>
                 <a:cs typeface="Times New Roman" charset="0"/>
               </a:rPr>
-              <a:t>9</a:t>
+              <a:t>19</a:t>
             </a:r>
             <a:endParaRPr lang="nl-NL" sz="1100" dirty="0">
               <a:latin typeface="Times New Roman" charset="0"/>
@@ -14026,7 +14656,7 @@
             </a:pPr>
             <a:r>
               <a:rPr lang="en-US" sz="2800" dirty="0"/>
-              <a:t>Reinforcement Learning in Wireless Networks</a:t>
+              <a:t>Stateless Q-learning</a:t>
             </a:r>
           </a:p>
           <a:p>
@@ -14376,12 +15006,20 @@
           <a:lstStyle/>
           <a:p>
             <a:r>
+              <a:rPr lang="nl-NL" sz="2000">
+                <a:latin typeface="Times New Roman" charset="0"/>
+                <a:ea typeface="Times New Roman" charset="0"/>
+                <a:cs typeface="Times New Roman" charset="0"/>
+              </a:rPr>
+              <a:t>2</a:t>
+            </a:r>
+            <a:r>
               <a:rPr lang="nl-NL" sz="2000" smtClean="0">
                 <a:latin typeface="Times New Roman" charset="0"/>
                 <a:ea typeface="Times New Roman" charset="0"/>
                 <a:cs typeface="Times New Roman" charset="0"/>
               </a:rPr>
-              <a:t>10</a:t>
+              <a:t>0</a:t>
             </a:r>
             <a:endParaRPr lang="nl-NL" sz="1100" dirty="0">
               <a:latin typeface="Times New Roman" charset="0"/>
@@ -14941,12 +15579,20 @@
           <a:lstStyle/>
           <a:p>
             <a:r>
+              <a:rPr lang="nl-NL" sz="2000">
+                <a:latin typeface="Times New Roman" charset="0"/>
+                <a:ea typeface="Times New Roman" charset="0"/>
+                <a:cs typeface="Times New Roman" charset="0"/>
+              </a:rPr>
+              <a:t>2</a:t>
+            </a:r>
+            <a:r>
               <a:rPr lang="nl-NL" sz="2000" smtClean="0">
                 <a:latin typeface="Times New Roman" charset="0"/>
                 <a:ea typeface="Times New Roman" charset="0"/>
                 <a:cs typeface="Times New Roman" charset="0"/>
               </a:rPr>
-              <a:t>11</a:t>
+              <a:t>1</a:t>
             </a:r>
             <a:endParaRPr lang="nl-NL" sz="1100" dirty="0">
               <a:latin typeface="Times New Roman" charset="0"/>
@@ -15274,12 +15920,12 @@
           <a:lstStyle/>
           <a:p>
             <a:r>
-              <a:rPr lang="nl-NL" sz="2000" smtClean="0">
+              <a:rPr lang="nl-NL" sz="2000">
                 <a:latin typeface="Times New Roman" charset="0"/>
                 <a:ea typeface="Times New Roman" charset="0"/>
                 <a:cs typeface="Times New Roman" charset="0"/>
               </a:rPr>
-              <a:t>14</a:t>
+              <a:t>22</a:t>
             </a:r>
             <a:endParaRPr lang="nl-NL" sz="1100" dirty="0">
               <a:latin typeface="Times New Roman" charset="0"/>
@@ -15736,7 +16382,7 @@
                 <a:ea typeface="Times New Roman" charset="0"/>
                 <a:cs typeface="Times New Roman" charset="0"/>
               </a:rPr>
-              <a:t>15</a:t>
+              <a:t>23</a:t>
             </a:r>
             <a:endParaRPr lang="nl-NL" sz="1100" dirty="0">
               <a:latin typeface="Times New Roman" charset="0"/>
@@ -16858,7 +17504,7 @@
                 <a:ea typeface="Times New Roman" charset="0"/>
                 <a:cs typeface="Times New Roman" charset="0"/>
               </a:rPr>
-              <a:t>23</a:t>
+              <a:t>24</a:t>
             </a:r>
             <a:endParaRPr lang="nl-NL" sz="1100" dirty="0">
               <a:latin typeface="Times New Roman" charset="0"/>
@@ -16915,7 +17561,12 @@
             <p:ph type="title"/>
           </p:nvPr>
         </p:nvSpPr>
-        <p:spPr/>
+        <p:spPr>
+          <a:xfrm>
+            <a:off x="3203848" y="2355726"/>
+            <a:ext cx="5472608" cy="1080120"/>
+          </a:xfrm>
+        </p:spPr>
         <p:txBody>
           <a:bodyPr/>
           <a:lstStyle/>
@@ -17079,7 +17730,55 @@
                   <a:ea typeface="Times New Roman" charset="0"/>
                   <a:cs typeface="Times New Roman" charset="0"/>
                 </a:rPr>
-                <a:t>Study the feasibility of achieving fair configurations that enhance the overall throughput in a decentralized way</a:t>
+                <a:t>Study the feasibility of achieving </a:t>
+              </a:r>
+              <a:r>
+                <a:rPr lang="en-US" b="1">
+                  <a:latin typeface="Times New Roman" charset="0"/>
+                  <a:ea typeface="Times New Roman" charset="0"/>
+                  <a:cs typeface="Times New Roman" charset="0"/>
+                </a:rPr>
+                <a:t>fair</a:t>
+              </a:r>
+              <a:r>
+                <a:rPr lang="en-US">
+                  <a:latin typeface="Times New Roman" charset="0"/>
+                  <a:ea typeface="Times New Roman" charset="0"/>
+                  <a:cs typeface="Times New Roman" charset="0"/>
+                </a:rPr>
+                <a:t> </a:t>
+              </a:r>
+              <a:r>
+                <a:rPr lang="en-US" b="1">
+                  <a:latin typeface="Times New Roman" charset="0"/>
+                  <a:ea typeface="Times New Roman" charset="0"/>
+                  <a:cs typeface="Times New Roman" charset="0"/>
+                </a:rPr>
+                <a:t>configurations</a:t>
+              </a:r>
+              <a:r>
+                <a:rPr lang="en-US">
+                  <a:latin typeface="Times New Roman" charset="0"/>
+                  <a:ea typeface="Times New Roman" charset="0"/>
+                  <a:cs typeface="Times New Roman" charset="0"/>
+                </a:rPr>
+                <a:t> that enhance the overall throughput in a </a:t>
+              </a:r>
+              <a:r>
+                <a:rPr lang="en-US" b="1">
+                  <a:latin typeface="Times New Roman" charset="0"/>
+                  <a:ea typeface="Times New Roman" charset="0"/>
+                  <a:cs typeface="Times New Roman" charset="0"/>
+                </a:rPr>
+                <a:t>decentralized</a:t>
+              </a:r>
+              <a:r>
+                <a:rPr lang="en-US">
+                  <a:latin typeface="Times New Roman" charset="0"/>
+                  <a:ea typeface="Times New Roman" charset="0"/>
+                  <a:cs typeface="Times New Roman" charset="0"/>
+                </a:rPr>
+                <a:t> way</a:t>
               </a:r>
             </a:p>
           </p:txBody>
@@ -17177,7 +17876,23 @@
                   <a:ea typeface="Times New Roman" charset="0"/>
                   <a:cs typeface="Times New Roman" charset="0"/>
                 </a:rPr>
-                <a:t>Uncoordinated Wireless Networks (WNs) that  compete for the same resources</a:t>
+                <a:t>Uncoordinated Wireless Networks (WNs) that  </a:t>
+              </a:r>
+              <a:r>
+                <a:rPr lang="es-ES" b="1">
+                  <a:latin typeface="Times New Roman" charset="0"/>
+                  <a:ea typeface="Times New Roman" charset="0"/>
+                  <a:cs typeface="Times New Roman" charset="0"/>
+                </a:rPr>
+                <a:t>compete</a:t>
+              </a:r>
+              <a:r>
+                <a:rPr lang="es-ES">
+                  <a:latin typeface="Times New Roman" charset="0"/>
+                  <a:ea typeface="Times New Roman" charset="0"/>
+                  <a:cs typeface="Times New Roman" charset="0"/>
+                </a:rPr>
+                <a:t> for the same resources</a:t>
               </a:r>
               <a:endParaRPr lang="en-US">
                 <a:latin typeface="Times New Roman" charset="0"/>
@@ -17296,9 +18011,33 @@
                   <a:ea typeface="Times New Roman" charset="0"/>
                   <a:cs typeface="Times New Roman" charset="0"/>
                 </a:rPr>
-                <a:t>more precisely a stateless variation  of Q-learning</a:t>
+                <a:t>more precisely a </a:t>
               </a:r>
-              <a:endParaRPr lang="en-US">
+              <a:r>
+                <a:rPr lang="es-ES" b="1">
+                  <a:latin typeface="Times New Roman" charset="0"/>
+                  <a:ea typeface="Times New Roman" charset="0"/>
+                  <a:cs typeface="Times New Roman" charset="0"/>
+                </a:rPr>
+                <a:t>stateless</a:t>
+              </a:r>
+              <a:r>
+                <a:rPr lang="es-ES">
+                  <a:latin typeface="Times New Roman" charset="0"/>
+                  <a:ea typeface="Times New Roman" charset="0"/>
+                  <a:cs typeface="Times New Roman" charset="0"/>
+                </a:rPr>
+                <a:t> variation of </a:t>
+              </a:r>
+              <a:r>
+                <a:rPr lang="es-ES" b="1">
+                  <a:latin typeface="Times New Roman" charset="0"/>
+                  <a:ea typeface="Times New Roman" charset="0"/>
+                  <a:cs typeface="Times New Roman" charset="0"/>
+                </a:rPr>
+                <a:t>Q-learning</a:t>
+              </a:r>
+              <a:endParaRPr lang="en-US" b="1">
                 <a:latin typeface="Times New Roman" charset="0"/>
                 <a:ea typeface="Times New Roman" charset="0"/>
                 <a:cs typeface="Times New Roman" charset="0"/>
@@ -17897,7 +18636,51 @@
                 <a:ea typeface="Times New Roman" charset="0"/>
                 <a:cs typeface="Times New Roman" charset="0"/>
               </a:rPr>
-              <a:t>Future WNs will be characterized by high-density and chaotic deployments</a:t>
+              <a:t>Future WNs will be characterized by </a:t>
+            </a:r>
+            <a:r>
+              <a:rPr lang="es-ES" sz="2000" b="1">
+                <a:solidFill>
+                  <a:schemeClr val="tx1"/>
+                </a:solidFill>
+                <a:latin typeface="Times New Roman" charset="0"/>
+                <a:ea typeface="Times New Roman" charset="0"/>
+                <a:cs typeface="Times New Roman" charset="0"/>
+              </a:rPr>
+              <a:t>high-density</a:t>
+            </a:r>
+            <a:r>
+              <a:rPr lang="es-ES" sz="2000">
+                <a:solidFill>
+                  <a:schemeClr val="tx1"/>
+                </a:solidFill>
+                <a:latin typeface="Times New Roman" charset="0"/>
+                <a:ea typeface="Times New Roman" charset="0"/>
+                <a:cs typeface="Times New Roman" charset="0"/>
+              </a:rPr>
+              <a:t> and </a:t>
+            </a:r>
+            <a:r>
+              <a:rPr lang="es-ES" sz="2000" b="1">
+                <a:solidFill>
+                  <a:schemeClr val="tx1"/>
+                </a:solidFill>
+                <a:latin typeface="Times New Roman" charset="0"/>
+                <a:ea typeface="Times New Roman" charset="0"/>
+                <a:cs typeface="Times New Roman" charset="0"/>
+              </a:rPr>
+              <a:t>chaotic</a:t>
+            </a:r>
+            <a:r>
+              <a:rPr lang="es-ES" sz="2000">
+                <a:solidFill>
+                  <a:schemeClr val="tx1"/>
+                </a:solidFill>
+                <a:latin typeface="Times New Roman" charset="0"/>
+                <a:ea typeface="Times New Roman" charset="0"/>
+                <a:cs typeface="Times New Roman" charset="0"/>
+              </a:rPr>
+              <a:t> deployments</a:t>
             </a:r>
             <a:endParaRPr lang="en-US" sz="2000" b="1">
               <a:solidFill>
@@ -18572,7 +19355,7 @@
             </a:r>
           </a:p>
           <a:p>
-            <a:pPr>
+            <a:pPr lvl="1">
               <a:buClr>
                 <a:srgbClr val="0432FF"/>
               </a:buClr>
@@ -20486,6 +21269,33 @@
                                   </p:childTnLst>
                                 </p:cTn>
                               </p:par>
+                              <p:par>
+                                <p:cTn id="11" presetID="1" presetClass="entr" presetSubtype="0" fill="hold" nodeType="withEffect">
+                                  <p:stCondLst>
+                                    <p:cond delay="0"/>
+                                  </p:stCondLst>
+                                  <p:childTnLst>
+                                    <p:set>
+                                      <p:cBhvr>
+                                        <p:cTn id="12" dur="1" fill="hold">
+                                          <p:stCondLst>
+                                            <p:cond delay="0"/>
+                                          </p:stCondLst>
+                                        </p:cTn>
+                                        <p:tgtEl>
+                                          <p:spTgt spid="38"/>
+                                        </p:tgtEl>
+                                        <p:attrNameLst>
+                                          <p:attrName>style.visibility</p:attrName>
+                                        </p:attrNameLst>
+                                      </p:cBhvr>
+                                      <p:to>
+                                        <p:strVal val="visible"/>
+                                      </p:to>
+                                    </p:set>
+                                  </p:childTnLst>
+                                </p:cTn>
+                              </p:par>
                             </p:childTnLst>
                           </p:cTn>
                         </p:par>
@@ -20493,26 +21303,26 @@
                     </p:cTn>
                   </p:par>
                   <p:par>
-                    <p:cTn id="11" fill="hold">
+                    <p:cTn id="13" fill="hold">
                       <p:stCondLst>
                         <p:cond delay="indefinite"/>
                       </p:stCondLst>
                       <p:childTnLst>
                         <p:par>
-                          <p:cTn id="12" fill="hold">
+                          <p:cTn id="14" fill="hold">
                             <p:stCondLst>
                               <p:cond delay="0"/>
                             </p:stCondLst>
                             <p:childTnLst>
                               <p:par>
-                                <p:cTn id="13" presetID="1" presetClass="entr" presetSubtype="0" fill="hold" grpId="0" nodeType="clickEffect">
+                                <p:cTn id="15" presetID="1" presetClass="entr" presetSubtype="0" fill="hold" grpId="0" nodeType="clickEffect">
                                   <p:stCondLst>
                                     <p:cond delay="0"/>
                                   </p:stCondLst>
                                   <p:childTnLst>
                                     <p:set>
                                       <p:cBhvr>
-                                        <p:cTn id="14" dur="1" fill="hold">
+                                        <p:cTn id="16" dur="1" fill="hold">
                                           <p:stCondLst>
                                             <p:cond delay="0"/>
                                           </p:stCondLst>
@@ -20532,34 +21342,7 @@
                                 </p:cTn>
                               </p:par>
                               <p:par>
-                                <p:cTn id="15" presetID="1" presetClass="entr" presetSubtype="0" fill="hold" grpId="0" nodeType="withEffect">
-                                  <p:stCondLst>
-                                    <p:cond delay="0"/>
-                                  </p:stCondLst>
-                                  <p:childTnLst>
-                                    <p:set>
-                                      <p:cBhvr>
-                                        <p:cTn id="16" dur="1" fill="hold">
-                                          <p:stCondLst>
-                                            <p:cond delay="0"/>
-                                          </p:stCondLst>
-                                        </p:cTn>
-                                        <p:tgtEl>
-                                          <p:spTgt spid="53"/>
-                                        </p:tgtEl>
-                                        <p:attrNameLst>
-                                          <p:attrName>style.visibility</p:attrName>
-                                        </p:attrNameLst>
-                                      </p:cBhvr>
-                                      <p:to>
-                                        <p:strVal val="visible"/>
-                                      </p:to>
-                                    </p:set>
-                                  </p:childTnLst>
-                                </p:cTn>
-                              </p:par>
-                              <p:par>
-                                <p:cTn id="17" presetID="1" presetClass="entr" presetSubtype="0" fill="hold" nodeType="withEffect">
+                                <p:cTn id="17" presetID="1" presetClass="entr" presetSubtype="0" fill="hold" grpId="0" nodeType="withEffect">
                                   <p:stCondLst>
                                     <p:cond delay="0"/>
                                   </p:stCondLst>
@@ -20572,7 +21355,7 @@
                                           </p:stCondLst>
                                         </p:cTn>
                                         <p:tgtEl>
-                                          <p:spTgt spid="109"/>
+                                          <p:spTgt spid="53"/>
                                         </p:tgtEl>
                                         <p:attrNameLst>
                                           <p:attrName>style.visibility</p:attrName>
@@ -20599,6 +21382,33 @@
                                           </p:stCondLst>
                                         </p:cTn>
                                         <p:tgtEl>
+                                          <p:spTgt spid="109"/>
+                                        </p:tgtEl>
+                                        <p:attrNameLst>
+                                          <p:attrName>style.visibility</p:attrName>
+                                        </p:attrNameLst>
+                                      </p:cBhvr>
+                                      <p:to>
+                                        <p:strVal val="visible"/>
+                                      </p:to>
+                                    </p:set>
+                                  </p:childTnLst>
+                                </p:cTn>
+                              </p:par>
+                              <p:par>
+                                <p:cTn id="21" presetID="1" presetClass="entr" presetSubtype="0" fill="hold" nodeType="withEffect">
+                                  <p:stCondLst>
+                                    <p:cond delay="0"/>
+                                  </p:stCondLst>
+                                  <p:childTnLst>
+                                    <p:set>
+                                      <p:cBhvr>
+                                        <p:cTn id="22" dur="1" fill="hold">
+                                          <p:stCondLst>
+                                            <p:cond delay="0"/>
+                                          </p:stCondLst>
+                                        </p:cTn>
+                                        <p:tgtEl>
                                           <p:spTgt spid="123"/>
                                         </p:tgtEl>
                                         <p:attrNameLst>
@@ -20619,26 +21429,26 @@
                     </p:cTn>
                   </p:par>
                   <p:par>
-                    <p:cTn id="21" fill="hold">
+                    <p:cTn id="23" fill="hold">
                       <p:stCondLst>
                         <p:cond delay="indefinite"/>
                       </p:stCondLst>
                       <p:childTnLst>
                         <p:par>
-                          <p:cTn id="22" fill="hold">
+                          <p:cTn id="24" fill="hold">
                             <p:stCondLst>
                               <p:cond delay="0"/>
                             </p:stCondLst>
                             <p:childTnLst>
                               <p:par>
-                                <p:cTn id="23" presetID="1" presetClass="entr" presetSubtype="0" fill="hold" grpId="0" nodeType="clickEffect">
+                                <p:cTn id="25" presetID="1" presetClass="entr" presetSubtype="0" fill="hold" grpId="0" nodeType="clickEffect">
                                   <p:stCondLst>
                                     <p:cond delay="0"/>
                                   </p:stCondLst>
                                   <p:childTnLst>
                                     <p:set>
                                       <p:cBhvr>
-                                        <p:cTn id="24" dur="1" fill="hold">
+                                        <p:cTn id="26" dur="1" fill="hold">
                                           <p:stCondLst>
                                             <p:cond delay="0"/>
                                           </p:stCondLst>
@@ -20658,14 +21468,14 @@
                                 </p:cTn>
                               </p:par>
                               <p:par>
-                                <p:cTn id="25" presetID="1" presetClass="entr" presetSubtype="0" fill="hold" grpId="0" nodeType="withEffect">
+                                <p:cTn id="27" presetID="1" presetClass="entr" presetSubtype="0" fill="hold" grpId="0" nodeType="withEffect">
                                   <p:stCondLst>
                                     <p:cond delay="0"/>
                                   </p:stCondLst>
                                   <p:childTnLst>
                                     <p:set>
                                       <p:cBhvr>
-                                        <p:cTn id="26" dur="1" fill="hold">
+                                        <p:cTn id="28" dur="1" fill="hold">
                                           <p:stCondLst>
                                             <p:cond delay="0"/>
                                           </p:stCondLst>
@@ -20691,26 +21501,26 @@
                     </p:cTn>
                   </p:par>
                   <p:par>
-                    <p:cTn id="27" fill="hold">
+                    <p:cTn id="29" fill="hold">
                       <p:stCondLst>
                         <p:cond delay="indefinite"/>
                       </p:stCondLst>
                       <p:childTnLst>
                         <p:par>
-                          <p:cTn id="28" fill="hold">
+                          <p:cTn id="30" fill="hold">
                             <p:stCondLst>
                               <p:cond delay="0"/>
                             </p:stCondLst>
                             <p:childTnLst>
                               <p:par>
-                                <p:cTn id="29" presetID="1" presetClass="entr" presetSubtype="0" fill="hold" grpId="0" nodeType="clickEffect">
+                                <p:cTn id="31" presetID="1" presetClass="entr" presetSubtype="0" fill="hold" grpId="0" nodeType="clickEffect">
                                   <p:stCondLst>
                                     <p:cond delay="0"/>
                                   </p:stCondLst>
                                   <p:childTnLst>
                                     <p:set>
                                       <p:cBhvr>
-                                        <p:cTn id="30" dur="1" fill="hold">
+                                        <p:cTn id="32" dur="1" fill="hold">
                                           <p:stCondLst>
                                             <p:cond delay="0"/>
                                           </p:stCondLst>
@@ -20730,34 +21540,7 @@
                                 </p:cTn>
                               </p:par>
                               <p:par>
-                                <p:cTn id="31" presetID="1" presetClass="entr" presetSubtype="0" fill="hold" grpId="0" nodeType="withEffect">
-                                  <p:stCondLst>
-                                    <p:cond delay="0"/>
-                                  </p:stCondLst>
-                                  <p:childTnLst>
-                                    <p:set>
-                                      <p:cBhvr>
-                                        <p:cTn id="32" dur="1" fill="hold">
-                                          <p:stCondLst>
-                                            <p:cond delay="0"/>
-                                          </p:stCondLst>
-                                        </p:cTn>
-                                        <p:tgtEl>
-                                          <p:spTgt spid="85"/>
-                                        </p:tgtEl>
-                                        <p:attrNameLst>
-                                          <p:attrName>style.visibility</p:attrName>
-                                        </p:attrNameLst>
-                                      </p:cBhvr>
-                                      <p:to>
-                                        <p:strVal val="visible"/>
-                                      </p:to>
-                                    </p:set>
-                                  </p:childTnLst>
-                                </p:cTn>
-                              </p:par>
-                              <p:par>
-                                <p:cTn id="33" presetID="1" presetClass="entr" presetSubtype="0" fill="hold" nodeType="withEffect">
+                                <p:cTn id="33" presetID="1" presetClass="entr" presetSubtype="0" fill="hold" grpId="0" nodeType="withEffect">
                                   <p:stCondLst>
                                     <p:cond delay="0"/>
                                   </p:stCondLst>
@@ -20770,7 +21553,7 @@
                                           </p:stCondLst>
                                         </p:cTn>
                                         <p:tgtEl>
-                                          <p:spTgt spid="38"/>
+                                          <p:spTgt spid="85"/>
                                         </p:tgtEl>
                                         <p:attrNameLst>
                                           <p:attrName>style.visibility</p:attrName>
@@ -21073,7 +21856,7 @@
                 <a:ea typeface="Times New Roman" charset="0"/>
                 <a:cs typeface="Times New Roman" charset="0"/>
               </a:rPr>
-              <a:t>11</a:t>
+              <a:t>7</a:t>
             </a:r>
             <a:endParaRPr lang="nl-NL" sz="1100" dirty="0">
               <a:latin typeface="Times New Roman" charset="0"/>
@@ -21110,11 +21893,7 @@
             </a:pPr>
             <a:r>
               <a:rPr lang="en-US" sz="1600"/>
-              <a:t>Q(s,a) is updated through the reward and the tuning</a:t>
-            </a:r>
-            <a:r>
-              <a:rPr lang="en-US" sz="1600"/>
-              <a:t> parameters:</a:t>
+              <a:t>Q(s,a) is updated through the reward and the tuning parameters:</a:t>
             </a:r>
           </a:p>
           <a:p>
@@ -21142,7 +21921,6 @@
               <a:rPr lang="en-US" sz="1400"/>
               <a:t>𝛾: discount factor</a:t>
             </a:r>
-            <a:endParaRPr lang="en-US" sz="1400"/>
           </a:p>
           <a:p>
             <a:pPr>
@@ -21574,7 +22352,7 @@
             </a:pPr>
             <a:r>
               <a:rPr lang="en-US" sz="1800" dirty="0"/>
-              <a:t>Stateless Q-learning</a:t>
+              <a:t>Q-learning</a:t>
             </a:r>
             <a:endParaRPr lang="en-US" sz="1800" dirty="0" smtClean="0"/>
           </a:p>
@@ -22013,38 +22791,6 @@
                   <a:t> plays an action is given by </a:t>
                 </a:r>
               </a:p>
-              <a:p>
-                <a:pPr>
-                  <a:buClr>
-                    <a:srgbClr val="00B050"/>
-                  </a:buClr>
-                </a:pPr>
-                <a:endParaRPr lang="en-US" sz="1600"/>
-              </a:p>
-              <a:p>
-                <a:pPr>
-                  <a:buClr>
-                    <a:srgbClr val="00B050"/>
-                  </a:buClr>
-                </a:pPr>
-                <a:endParaRPr lang="en-US" sz="1600"/>
-              </a:p>
-              <a:p>
-                <a:pPr>
-                  <a:buClr>
-                    <a:srgbClr val="00B050"/>
-                  </a:buClr>
-                </a:pPr>
-                <a:endParaRPr lang="en-US" sz="1600"/>
-              </a:p>
-              <a:p>
-                <a:pPr>
-                  <a:buClr>
-                    <a:srgbClr val="00B050"/>
-                  </a:buClr>
-                </a:pPr>
-                <a:endParaRPr lang="en-US" sz="1600"/>
-              </a:p>
             </p:txBody>
           </p:sp>
         </mc:Choice>
@@ -22355,7 +23101,7 @@
                   <a:srgbClr val="000000"/>
                 </a:solidFill>
               </a:rPr>
-              <a:t>scalar reward signal*</a:t>
+              <a:t>scalar reward signal</a:t>
             </a:r>
             <a:endParaRPr lang="en-US" sz="1600"/>
           </a:p>
@@ -22392,10 +23138,15 @@
                             </p:stCondLst>
                             <p:childTnLst>
                               <p:par>
-                                <p:cTn id="5" presetID="1" presetClass="entr" presetSubtype="0" fill="hold" grpId="0" nodeType="clickEffect">
+                                <p:cTn id="5" presetID="1" presetClass="entr" presetSubtype="0" fill="hold" grpId="0" nodeType="clickEffect" nodePh="1">
                                   <p:stCondLst>
                                     <p:cond delay="0"/>
                                   </p:stCondLst>
+                                  <p:endCondLst>
+                                    <p:cond evt="begin" delay="0">
+                                      <p:tn val="5"/>
+                                    </p:cond>
+                                  </p:endCondLst>
                                   <p:childTnLst>
                                     <p:set>
                                       <p:cBhvr>
@@ -22405,7 +23156,7 @@
                                           </p:stCondLst>
                                         </p:cTn>
                                         <p:tgtEl>
-                                          <p:spTgt spid="20"/>
+                                          <p:spTgt spid="10"/>
                                         </p:tgtEl>
                                         <p:attrNameLst>
                                           <p:attrName>style.visibility</p:attrName>
@@ -22418,26 +23169,35 @@
                                   </p:childTnLst>
                                 </p:cTn>
                               </p:par>
-                            </p:childTnLst>
-                          </p:cTn>
-                        </p:par>
-                      </p:childTnLst>
-                    </p:cTn>
-                  </p:par>
-                  <p:par>
-                    <p:cTn id="7" fill="hold">
-                      <p:stCondLst>
-                        <p:cond delay="indefinite"/>
-                      </p:stCondLst>
-                      <p:childTnLst>
-                        <p:par>
-                          <p:cTn id="8" fill="hold">
-                            <p:stCondLst>
-                              <p:cond delay="0"/>
-                            </p:stCondLst>
-                            <p:childTnLst>
                               <p:par>
-                                <p:cTn id="9" presetID="1" presetClass="entr" presetSubtype="0" fill="hold" grpId="0" nodeType="clickEffect">
+                                <p:cTn id="7" presetID="1" presetClass="entr" presetSubtype="0" fill="hold" grpId="0" nodeType="withEffect">
+                                  <p:stCondLst>
+                                    <p:cond delay="0"/>
+                                  </p:stCondLst>
+                                  <p:childTnLst>
+                                    <p:set>
+                                      <p:cBhvr>
+                                        <p:cTn id="8" dur="1" fill="hold">
+                                          <p:stCondLst>
+                                            <p:cond delay="0"/>
+                                          </p:stCondLst>
+                                        </p:cTn>
+                                        <p:tgtEl>
+                                          <p:spTgt spid="12"/>
+                                        </p:tgtEl>
+                                        <p:attrNameLst>
+                                          <p:attrName>style.visibility</p:attrName>
+                                        </p:attrNameLst>
+                                      </p:cBhvr>
+                                      <p:to>
+                                        <p:strVal val="visible"/>
+                                      </p:to>
+                                    </p:set>
+                                  </p:childTnLst>
+                                </p:cTn>
+                              </p:par>
+                              <p:par>
+                                <p:cTn id="9" presetID="1" presetClass="entr" presetSubtype="0" fill="hold" nodeType="withEffect">
                                   <p:stCondLst>
                                     <p:cond delay="0"/>
                                   </p:stCondLst>
@@ -22450,7 +23210,7 @@
                                           </p:stCondLst>
                                         </p:cTn>
                                         <p:tgtEl>
-                                          <p:spTgt spid="12"/>
+                                          <p:spTgt spid="19"/>
                                         </p:tgtEl>
                                         <p:attrNameLst>
                                           <p:attrName>style.visibility</p:attrName>
@@ -22477,7 +23237,7 @@
                                           </p:stCondLst>
                                         </p:cTn>
                                         <p:tgtEl>
-                                          <p:spTgt spid="13"/>
+                                          <p:spTgt spid="21"/>
                                         </p:tgtEl>
                                         <p:attrNameLst>
                                           <p:attrName>style.visibility</p:attrName>
@@ -22522,7 +23282,162 @@
                                           </p:stCondLst>
                                         </p:cTn>
                                         <p:tgtEl>
-                                          <p:spTgt spid="15"/>
+                                          <p:spTgt spid="20">
+                                            <p:txEl>
+                                              <p:pRg st="0" end="0"/>
+                                            </p:txEl>
+                                          </p:spTgt>
+                                        </p:tgtEl>
+                                        <p:attrNameLst>
+                                          <p:attrName>style.visibility</p:attrName>
+                                        </p:attrNameLst>
+                                      </p:cBhvr>
+                                      <p:to>
+                                        <p:strVal val="visible"/>
+                                      </p:to>
+                                    </p:set>
+                                  </p:childTnLst>
+                                </p:cTn>
+                              </p:par>
+                              <p:par>
+                                <p:cTn id="17" presetID="1" presetClass="entr" presetSubtype="0" fill="hold" grpId="0" nodeType="withEffect">
+                                  <p:stCondLst>
+                                    <p:cond delay="0"/>
+                                  </p:stCondLst>
+                                  <p:childTnLst>
+                                    <p:set>
+                                      <p:cBhvr>
+                                        <p:cTn id="18" dur="1" fill="hold">
+                                          <p:stCondLst>
+                                            <p:cond delay="0"/>
+                                          </p:stCondLst>
+                                        </p:cTn>
+                                        <p:tgtEl>
+                                          <p:spTgt spid="20">
+                                            <p:txEl>
+                                              <p:pRg st="1" end="1"/>
+                                            </p:txEl>
+                                          </p:spTgt>
+                                        </p:tgtEl>
+                                        <p:attrNameLst>
+                                          <p:attrName>style.visibility</p:attrName>
+                                        </p:attrNameLst>
+                                      </p:cBhvr>
+                                      <p:to>
+                                        <p:strVal val="visible"/>
+                                      </p:to>
+                                    </p:set>
+                                  </p:childTnLst>
+                                </p:cTn>
+                              </p:par>
+                              <p:par>
+                                <p:cTn id="19" presetID="1" presetClass="entr" presetSubtype="0" fill="hold" grpId="0" nodeType="withEffect">
+                                  <p:stCondLst>
+                                    <p:cond delay="0"/>
+                                  </p:stCondLst>
+                                  <p:childTnLst>
+                                    <p:set>
+                                      <p:cBhvr>
+                                        <p:cTn id="20" dur="1" fill="hold">
+                                          <p:stCondLst>
+                                            <p:cond delay="0"/>
+                                          </p:stCondLst>
+                                        </p:cTn>
+                                        <p:tgtEl>
+                                          <p:spTgt spid="20">
+                                            <p:txEl>
+                                              <p:pRg st="2" end="2"/>
+                                            </p:txEl>
+                                          </p:spTgt>
+                                        </p:tgtEl>
+                                        <p:attrNameLst>
+                                          <p:attrName>style.visibility</p:attrName>
+                                        </p:attrNameLst>
+                                      </p:cBhvr>
+                                      <p:to>
+                                        <p:strVal val="visible"/>
+                                      </p:to>
+                                    </p:set>
+                                  </p:childTnLst>
+                                </p:cTn>
+                              </p:par>
+                              <p:par>
+                                <p:cTn id="21" presetID="1" presetClass="entr" presetSubtype="0" fill="hold" grpId="0" nodeType="withEffect">
+                                  <p:stCondLst>
+                                    <p:cond delay="0"/>
+                                  </p:stCondLst>
+                                  <p:childTnLst>
+                                    <p:set>
+                                      <p:cBhvr>
+                                        <p:cTn id="22" dur="1" fill="hold">
+                                          <p:stCondLst>
+                                            <p:cond delay="0"/>
+                                          </p:stCondLst>
+                                        </p:cTn>
+                                        <p:tgtEl>
+                                          <p:spTgt spid="20">
+                                            <p:txEl>
+                                              <p:pRg st="3" end="3"/>
+                                            </p:txEl>
+                                          </p:spTgt>
+                                        </p:tgtEl>
+                                        <p:attrNameLst>
+                                          <p:attrName>style.visibility</p:attrName>
+                                        </p:attrNameLst>
+                                      </p:cBhvr>
+                                      <p:to>
+                                        <p:strVal val="visible"/>
+                                      </p:to>
+                                    </p:set>
+                                  </p:childTnLst>
+                                </p:cTn>
+                              </p:par>
+                              <p:par>
+                                <p:cTn id="23" presetID="1" presetClass="entr" presetSubtype="0" fill="hold" grpId="0" nodeType="withEffect">
+                                  <p:stCondLst>
+                                    <p:cond delay="0"/>
+                                  </p:stCondLst>
+                                  <p:childTnLst>
+                                    <p:set>
+                                      <p:cBhvr>
+                                        <p:cTn id="24" dur="1" fill="hold">
+                                          <p:stCondLst>
+                                            <p:cond delay="0"/>
+                                          </p:stCondLst>
+                                        </p:cTn>
+                                        <p:tgtEl>
+                                          <p:spTgt spid="20">
+                                            <p:txEl>
+                                              <p:pRg st="4" end="4"/>
+                                            </p:txEl>
+                                          </p:spTgt>
+                                        </p:tgtEl>
+                                        <p:attrNameLst>
+                                          <p:attrName>style.visibility</p:attrName>
+                                        </p:attrNameLst>
+                                      </p:cBhvr>
+                                      <p:to>
+                                        <p:strVal val="visible"/>
+                                      </p:to>
+                                    </p:set>
+                                  </p:childTnLst>
+                                </p:cTn>
+                              </p:par>
+                              <p:par>
+                                <p:cTn id="25" presetID="1" presetClass="entr" presetSubtype="0" fill="hold" grpId="0" nodeType="withEffect">
+                                  <p:stCondLst>
+                                    <p:cond delay="0"/>
+                                  </p:stCondLst>
+                                  <p:childTnLst>
+                                    <p:set>
+                                      <p:cBhvr>
+                                        <p:cTn id="26" dur="1" fill="hold">
+                                          <p:stCondLst>
+                                            <p:cond delay="0"/>
+                                          </p:stCondLst>
+                                        </p:cTn>
+                                        <p:tgtEl>
+                                          <p:spTgt spid="13"/>
                                         </p:tgtEl>
                                         <p:attrNameLst>
                                           <p:attrName>style.visibility</p:attrName>
@@ -22542,26 +23457,53 @@
                     </p:cTn>
                   </p:par>
                   <p:par>
-                    <p:cTn id="17" fill="hold">
+                    <p:cTn id="27" fill="hold">
                       <p:stCondLst>
                         <p:cond delay="indefinite"/>
                       </p:stCondLst>
                       <p:childTnLst>
                         <p:par>
-                          <p:cTn id="18" fill="hold">
+                          <p:cTn id="28" fill="hold">
                             <p:stCondLst>
                               <p:cond delay="0"/>
                             </p:stCondLst>
                             <p:childTnLst>
                               <p:par>
-                                <p:cTn id="19" presetID="1" presetClass="entr" presetSubtype="0" fill="hold" grpId="0" nodeType="clickEffect">
+                                <p:cTn id="29" presetID="1" presetClass="entr" presetSubtype="0" fill="hold" nodeType="clickEffect">
                                   <p:stCondLst>
                                     <p:cond delay="0"/>
                                   </p:stCondLst>
                                   <p:childTnLst>
                                     <p:set>
                                       <p:cBhvr>
-                                        <p:cTn id="20" dur="1" fill="hold">
+                                        <p:cTn id="30" dur="1" fill="hold">
+                                          <p:stCondLst>
+                                            <p:cond delay="0"/>
+                                          </p:stCondLst>
+                                        </p:cTn>
+                                        <p:tgtEl>
+                                          <p:spTgt spid="18"/>
+                                        </p:tgtEl>
+                                        <p:attrNameLst>
+                                          <p:attrName>style.visibility</p:attrName>
+                                        </p:attrNameLst>
+                                      </p:cBhvr>
+                                      <p:to>
+                                        <p:strVal val="visible"/>
+                                      </p:to>
+                                    </p:set>
+                                  </p:childTnLst>
+                                </p:cTn>
+                              </p:par>
+                              <p:par>
+                                <p:cTn id="31" presetID="1" presetClass="entr" presetSubtype="0" fill="hold" grpId="0" nodeType="withEffect">
+                                  <p:stCondLst>
+                                    <p:cond delay="0"/>
+                                  </p:stCondLst>
+                                  <p:childTnLst>
+                                    <p:set>
+                                      <p:cBhvr>
+                                        <p:cTn id="32" dur="1" fill="hold">
                                           <p:stCondLst>
                                             <p:cond delay="0"/>
                                           </p:stCondLst>
@@ -22581,65 +23523,20 @@
                                 </p:cTn>
                               </p:par>
                               <p:par>
-                                <p:cTn id="21" presetID="1" presetClass="entr" presetSubtype="0" fill="hold" nodeType="withEffect">
+                                <p:cTn id="33" presetID="1" presetClass="entr" presetSubtype="0" fill="hold" grpId="0" nodeType="withEffect">
                                   <p:stCondLst>
                                     <p:cond delay="0"/>
                                   </p:stCondLst>
                                   <p:childTnLst>
                                     <p:set>
                                       <p:cBhvr>
-                                        <p:cTn id="22" dur="1" fill="hold">
+                                        <p:cTn id="34" dur="1" fill="hold">
                                           <p:stCondLst>
                                             <p:cond delay="0"/>
                                           </p:stCondLst>
                                         </p:cTn>
                                         <p:tgtEl>
-                                          <p:spTgt spid="19"/>
-                                        </p:tgtEl>
-                                        <p:attrNameLst>
-                                          <p:attrName>style.visibility</p:attrName>
-                                        </p:attrNameLst>
-                                      </p:cBhvr>
-                                      <p:to>
-                                        <p:strVal val="visible"/>
-                                      </p:to>
-                                    </p:set>
-                                  </p:childTnLst>
-                                </p:cTn>
-                              </p:par>
-                            </p:childTnLst>
-                          </p:cTn>
-                        </p:par>
-                      </p:childTnLst>
-                    </p:cTn>
-                  </p:par>
-                  <p:par>
-                    <p:cTn id="23" fill="hold">
-                      <p:stCondLst>
-                        <p:cond delay="indefinite"/>
-                      </p:stCondLst>
-                      <p:childTnLst>
-                        <p:par>
-                          <p:cTn id="24" fill="hold">
-                            <p:stCondLst>
-                              <p:cond delay="0"/>
-                            </p:stCondLst>
-                            <p:childTnLst>
-                              <p:par>
-                                <p:cTn id="25" presetID="1" presetClass="entr" presetSubtype="0" fill="hold" grpId="0" nodeType="clickEffect">
-                                  <p:stCondLst>
-                                    <p:cond delay="0"/>
-                                  </p:stCondLst>
-                                  <p:childTnLst>
-                                    <p:set>
-                                      <p:cBhvr>
-                                        <p:cTn id="26" dur="1" fill="hold">
-                                          <p:stCondLst>
-                                            <p:cond delay="0"/>
-                                          </p:stCondLst>
-                                        </p:cTn>
-                                        <p:tgtEl>
-                                          <p:spTgt spid="21"/>
+                                          <p:spTgt spid="15"/>
                                         </p:tgtEl>
                                         <p:attrNameLst>
                                           <p:attrName>style.visibility</p:attrName>
@@ -22680,7 +23577,8 @@
       </p:par>
     </p:tnLst>
     <p:bldLst>
-      <p:bldP spid="20" grpId="0"/>
+      <p:bldP spid="10" grpId="0"/>
+      <p:bldP spid="20" grpId="0" build="p"/>
       <p:bldP spid="12" grpId="0" animBg="1"/>
       <p:bldP spid="13" grpId="0" animBg="1"/>
       <p:bldP spid="15" grpId="0" animBg="1"/>
@@ -22958,12 +23856,12 @@
           <a:lstStyle/>
           <a:p>
             <a:r>
-              <a:rPr lang="nl-NL" sz="2000" smtClean="0">
+              <a:rPr lang="nl-NL" sz="2000">
                 <a:latin typeface="Times New Roman" charset="0"/>
                 <a:ea typeface="Times New Roman" charset="0"/>
                 <a:cs typeface="Times New Roman" charset="0"/>
               </a:rPr>
-              <a:t>13</a:t>
+              <a:t>9</a:t>
             </a:r>
             <a:endParaRPr lang="nl-NL" sz="1100" dirty="0">
               <a:latin typeface="Times New Roman" charset="0"/>
@@ -23176,7 +24074,7 @@
                             </p:stCondLst>
                             <p:childTnLst>
                               <p:par>
-                                <p:cTn id="5" presetID="1" presetClass="entr" presetSubtype="0" fill="hold" grpId="0" nodeType="clickEffect">
+                                <p:cTn id="5" presetID="1" presetClass="entr" presetSubtype="0" fill="hold" nodeType="clickEffect">
                                   <p:stCondLst>
                                     <p:cond delay="0"/>
                                   </p:stCondLst>
@@ -23189,7 +24087,7 @@
                                           </p:stCondLst>
                                         </p:cTn>
                                         <p:tgtEl>
-                                          <p:spTgt spid="9"/>
+                                          <p:spTgt spid="11"/>
                                         </p:tgtEl>
                                         <p:attrNameLst>
                                           <p:attrName>style.visibility</p:attrName>
@@ -23221,7 +24119,7 @@
                             </p:stCondLst>
                             <p:childTnLst>
                               <p:par>
-                                <p:cTn id="9" presetID="1" presetClass="entr" presetSubtype="0" fill="hold" nodeType="clickEffect">
+                                <p:cTn id="9" presetID="1" presetClass="entr" presetSubtype="0" fill="hold" grpId="0" nodeType="clickEffect">
                                   <p:stCondLst>
                                     <p:cond delay="0"/>
                                   </p:stCondLst>
@@ -23234,7 +24132,138 @@
                                           </p:stCondLst>
                                         </p:cTn>
                                         <p:tgtEl>
-                                          <p:spTgt spid="11"/>
+                                          <p:spTgt spid="9"/>
+                                        </p:tgtEl>
+                                        <p:attrNameLst>
+                                          <p:attrName>style.visibility</p:attrName>
+                                        </p:attrNameLst>
+                                      </p:cBhvr>
+                                      <p:to>
+                                        <p:strVal val="visible"/>
+                                      </p:to>
+                                    </p:set>
+                                  </p:childTnLst>
+                                </p:cTn>
+                              </p:par>
+                              <p:par>
+                                <p:cTn id="11" presetID="1" presetClass="entr" presetSubtype="0" fill="hold" grpId="0" nodeType="withEffect" nodePh="1">
+                                  <p:stCondLst>
+                                    <p:cond delay="0"/>
+                                  </p:stCondLst>
+                                  <p:endCondLst>
+                                    <p:cond evt="begin" delay="0">
+                                      <p:tn val="11"/>
+                                    </p:cond>
+                                  </p:endCondLst>
+                                  <p:childTnLst>
+                                    <p:set>
+                                      <p:cBhvr>
+                                        <p:cTn id="12" dur="1" fill="hold">
+                                          <p:stCondLst>
+                                            <p:cond delay="0"/>
+                                          </p:stCondLst>
+                                        </p:cTn>
+                                        <p:tgtEl>
+                                          <p:spTgt spid="10"/>
+                                        </p:tgtEl>
+                                        <p:attrNameLst>
+                                          <p:attrName>style.visibility</p:attrName>
+                                        </p:attrNameLst>
+                                      </p:cBhvr>
+                                      <p:to>
+                                        <p:strVal val="visible"/>
+                                      </p:to>
+                                    </p:set>
+                                  </p:childTnLst>
+                                </p:cTn>
+                              </p:par>
+                              <p:par>
+                                <p:cTn id="13" presetID="1" presetClass="entr" presetSubtype="0" fill="hold" nodeType="withEffect">
+                                  <p:stCondLst>
+                                    <p:cond delay="0"/>
+                                  </p:stCondLst>
+                                  <p:childTnLst>
+                                    <p:set>
+                                      <p:cBhvr>
+                                        <p:cTn id="14" dur="1" fill="hold">
+                                          <p:stCondLst>
+                                            <p:cond delay="0"/>
+                                          </p:stCondLst>
+                                        </p:cTn>
+                                        <p:tgtEl>
+                                          <p:spTgt spid="6"/>
+                                        </p:tgtEl>
+                                        <p:attrNameLst>
+                                          <p:attrName>style.visibility</p:attrName>
+                                        </p:attrNameLst>
+                                      </p:cBhvr>
+                                      <p:to>
+                                        <p:strVal val="visible"/>
+                                      </p:to>
+                                    </p:set>
+                                  </p:childTnLst>
+                                </p:cTn>
+                              </p:par>
+                              <p:par>
+                                <p:cTn id="15" presetID="1" presetClass="entr" presetSubtype="0" fill="hold" grpId="1" nodeType="withEffect">
+                                  <p:stCondLst>
+                                    <p:cond delay="0"/>
+                                  </p:stCondLst>
+                                  <p:childTnLst>
+                                    <p:set>
+                                      <p:cBhvr>
+                                        <p:cTn id="16" dur="1" fill="hold">
+                                          <p:stCondLst>
+                                            <p:cond delay="0"/>
+                                          </p:stCondLst>
+                                        </p:cTn>
+                                        <p:tgtEl>
+                                          <p:spTgt spid="9"/>
+                                        </p:tgtEl>
+                                        <p:attrNameLst>
+                                          <p:attrName>style.visibility</p:attrName>
+                                        </p:attrNameLst>
+                                      </p:cBhvr>
+                                      <p:to>
+                                        <p:strVal val="visible"/>
+                                      </p:to>
+                                    </p:set>
+                                  </p:childTnLst>
+                                </p:cTn>
+                              </p:par>
+                            </p:childTnLst>
+                          </p:cTn>
+                        </p:par>
+                      </p:childTnLst>
+                    </p:cTn>
+                  </p:par>
+                  <p:par>
+                    <p:cTn id="17" fill="hold">
+                      <p:stCondLst>
+                        <p:cond delay="indefinite"/>
+                      </p:stCondLst>
+                      <p:childTnLst>
+                        <p:par>
+                          <p:cTn id="18" fill="hold">
+                            <p:stCondLst>
+                              <p:cond delay="0"/>
+                            </p:stCondLst>
+                            <p:childTnLst>
+                              <p:par>
+                                <p:cTn id="19" presetID="1" presetClass="entr" presetSubtype="0" fill="hold" grpId="0" nodeType="clickEffect">
+                                  <p:stCondLst>
+                                    <p:cond delay="0"/>
+                                  </p:stCondLst>
+                                  <p:childTnLst>
+                                    <p:set>
+                                      <p:cBhvr>
+                                        <p:cTn id="20" dur="1" fill="hold">
+                                          <p:stCondLst>
+                                            <p:cond delay="0"/>
+                                          </p:stCondLst>
+                                        </p:cTn>
+                                        <p:tgtEl>
+                                          <p:spTgt spid="7"/>
                                         </p:tgtEl>
                                         <p:attrNameLst>
                                           <p:attrName>style.visibility</p:attrName>
@@ -23275,7 +24304,10 @@
       </p:par>
     </p:tnLst>
     <p:bldLst>
+      <p:bldP spid="10" grpId="0"/>
       <p:bldP spid="9" grpId="0"/>
+      <p:bldP spid="9" grpId="1"/>
+      <p:bldP spid="7" grpId="0" animBg="1"/>
     </p:bldLst>
   </p:timing>
 </p:sld>

</xml_diff>